<commit_message>
Try out css flag creation using linear-gradient
</commit_message>
<xml_diff>
--- a/DesignBrief/Research&Design.pptx
+++ b/DesignBrief/Research&Design.pptx
@@ -108,6 +108,11 @@
       </a:defRPr>
     </a:lvl9pPr>
   </p:defaultTextStyle>
+  <p:extLst>
+    <p:ext uri="{EFAFB233-063F-42B5-8137-9DF3F51BA10A}">
+      <p15:sldGuideLst xmlns:p15="http://schemas.microsoft.com/office/powerpoint/2012/main"/>
+    </p:ext>
+  </p:extLst>
 </p:presentation>
 </file>
 
@@ -3749,6 +3754,140 @@
           </a:p>
         </p:txBody>
       </p:sp>
+      <p:sp>
+        <p:nvSpPr>
+          <p:cNvPr id="3" name="TextBox 2">
+            <a:extLst>
+              <a:ext uri="{FF2B5EF4-FFF2-40B4-BE49-F238E27FC236}">
+                <a16:creationId xmlns:a16="http://schemas.microsoft.com/office/drawing/2014/main" id="{B22DB85A-5161-4379-AB97-6263D2F730A1}"/>
+              </a:ext>
+            </a:extLst>
+          </p:cNvPr>
+          <p:cNvSpPr txBox="1"/>
+          <p:nvPr/>
+        </p:nvSpPr>
+        <p:spPr>
+          <a:xfrm>
+            <a:off x="327171" y="2627040"/>
+            <a:ext cx="1693669" cy="1384995"/>
+          </a:xfrm>
+          <a:prstGeom prst="rect">
+            <a:avLst/>
+          </a:prstGeom>
+          <a:noFill/>
+        </p:spPr>
+        <p:txBody>
+          <a:bodyPr wrap="none" rtlCol="0">
+            <a:spAutoFit/>
+          </a:bodyPr>
+          <a:lstStyle/>
+          <a:p>
+            <a:r>
+              <a:rPr lang="en-GB" sz="1200" dirty="0"/>
+              <a:t>Union flag:</a:t>
+            </a:r>
+          </a:p>
+          <a:p>
+            <a:r>
+              <a:rPr lang="en-GB" sz="1200" dirty="0"/>
+              <a:t>3:5 ratio</a:t>
+            </a:r>
+          </a:p>
+          <a:p>
+            <a:r>
+              <a:rPr lang="en-GB" sz="1200" dirty="0"/>
+              <a:t>Diagonals 6x(3w/2r/1w)</a:t>
+            </a:r>
+          </a:p>
+          <a:p>
+            <a:r>
+              <a:rPr lang="en-GB" sz="1200" dirty="0"/>
+              <a:t>Red cross 6x</a:t>
+            </a:r>
+          </a:p>
+          <a:p>
+            <a:r>
+              <a:rPr lang="en-GB" sz="1200" dirty="0"/>
+              <a:t>White fimbriation 2x</a:t>
+            </a:r>
+          </a:p>
+          <a:p>
+            <a:r>
+              <a:rPr lang="en-GB" sz="1200" dirty="0"/>
+              <a:t>Blue – </a:t>
+            </a:r>
+            <a:r>
+              <a:rPr lang="en-GB" sz="1200" dirty="0" err="1"/>
+              <a:t>rgb</a:t>
+            </a:r>
+            <a:r>
+              <a:rPr lang="en-GB" sz="1200" dirty="0"/>
+              <a:t>(0, 36, 125)</a:t>
+            </a:r>
+          </a:p>
+          <a:p>
+            <a:r>
+              <a:rPr lang="en-GB" sz="1200" dirty="0"/>
+              <a:t>Red – </a:t>
+            </a:r>
+            <a:r>
+              <a:rPr lang="en-GB" sz="1200" dirty="0" err="1"/>
+              <a:t>rgb</a:t>
+            </a:r>
+            <a:r>
+              <a:rPr lang="en-GB" sz="1200" dirty="0"/>
+              <a:t>(207, 20, 43)</a:t>
+            </a:r>
+          </a:p>
+        </p:txBody>
+      </p:sp>
+      <p:pic>
+        <p:nvPicPr>
+          <p:cNvPr id="1026" name="Picture 2" descr="3x5 Union Flag Diagram">
+            <a:extLst>
+              <a:ext uri="{FF2B5EF4-FFF2-40B4-BE49-F238E27FC236}">
+                <a16:creationId xmlns:a16="http://schemas.microsoft.com/office/drawing/2014/main" id="{79F840F4-FCE5-410D-B03E-D8857F65FC44}"/>
+              </a:ext>
+            </a:extLst>
+          </p:cNvPr>
+          <p:cNvPicPr>
+            <a:picLocks noChangeAspect="1" noChangeArrowheads="1"/>
+          </p:cNvPicPr>
+          <p:nvPr/>
+        </p:nvPicPr>
+        <p:blipFill>
+          <a:blip r:embed="rId2">
+            <a:extLst>
+              <a:ext uri="{28A0092B-C50C-407E-A947-70E740481C1C}">
+                <a14:useLocalDpi xmlns:a14="http://schemas.microsoft.com/office/drawing/2010/main" val="0"/>
+              </a:ext>
+            </a:extLst>
+          </a:blip>
+          <a:srcRect/>
+          <a:stretch>
+            <a:fillRect/>
+          </a:stretch>
+        </p:blipFill>
+        <p:spPr bwMode="auto">
+          <a:xfrm>
+            <a:off x="112597" y="4012035"/>
+            <a:ext cx="3270068" cy="2673991"/>
+          </a:xfrm>
+          <a:prstGeom prst="rect">
+            <a:avLst/>
+          </a:prstGeom>
+          <a:noFill/>
+          <a:extLst>
+            <a:ext uri="{909E8E84-426E-40DD-AFC4-6F175D3DCCD1}">
+              <a14:hiddenFill xmlns:a14="http://schemas.microsoft.com/office/drawing/2010/main">
+                <a:solidFill>
+                  <a:srgbClr val="FFFFFF"/>
+                </a:solidFill>
+              </a14:hiddenFill>
+            </a:ext>
+          </a:extLst>
+        </p:spPr>
+      </p:pic>
     </p:spTree>
     <p:extLst>
       <p:ext uri="{BB962C8B-B14F-4D97-AF65-F5344CB8AC3E}">

</xml_diff>